<commit_message>
pequenas correções no texto
</commit_message>
<xml_diff>
--- a/hci.pptx
+++ b/hci.pptx
@@ -3220,7 +3220,7 @@
           <a:p>
             <a:fld id="{94D3EB41-CF60-4C9F-BD83-AE56FA0945EB}" type="datetimeFigureOut">
               <a:rPr lang="pt-BR" smtClean="0"/>
-              <a:t>19/08/2020</a:t>
+              <a:t>20/08/2020</a:t>
             </a:fld>
             <a:endParaRPr lang="pt-BR"/>
           </a:p>
@@ -3733,7 +3733,7 @@
           <a:p>
             <a:fld id="{9642BF85-54FF-46CE-B398-87F998CFD60B}" type="datetimeFigureOut">
               <a:rPr lang="pt-BR" smtClean="0"/>
-              <a:t>19/08/2020</a:t>
+              <a:t>20/08/2020</a:t>
             </a:fld>
             <a:endParaRPr lang="pt-BR"/>
           </a:p>
@@ -3901,7 +3901,7 @@
           <a:p>
             <a:fld id="{9642BF85-54FF-46CE-B398-87F998CFD60B}" type="datetimeFigureOut">
               <a:rPr lang="pt-BR" smtClean="0"/>
-              <a:t>19/08/2020</a:t>
+              <a:t>20/08/2020</a:t>
             </a:fld>
             <a:endParaRPr lang="pt-BR"/>
           </a:p>
@@ -4079,7 +4079,7 @@
           <a:p>
             <a:fld id="{9642BF85-54FF-46CE-B398-87F998CFD60B}" type="datetimeFigureOut">
               <a:rPr lang="pt-BR" smtClean="0"/>
-              <a:t>19/08/2020</a:t>
+              <a:t>20/08/2020</a:t>
             </a:fld>
             <a:endParaRPr lang="pt-BR"/>
           </a:p>
@@ -4342,7 +4342,7 @@
           <a:p>
             <a:fld id="{9642BF85-54FF-46CE-B398-87F998CFD60B}" type="datetimeFigureOut">
               <a:rPr lang="pt-BR" smtClean="0"/>
-              <a:t>19/08/2020</a:t>
+              <a:t>20/08/2020</a:t>
             </a:fld>
             <a:endParaRPr lang="pt-BR"/>
           </a:p>
@@ -4613,7 +4613,7 @@
           <a:p>
             <a:fld id="{9642BF85-54FF-46CE-B398-87F998CFD60B}" type="datetimeFigureOut">
               <a:rPr lang="pt-BR" smtClean="0"/>
-              <a:t>19/08/2020</a:t>
+              <a:t>20/08/2020</a:t>
             </a:fld>
             <a:endParaRPr lang="pt-BR"/>
           </a:p>
@@ -4859,7 +4859,7 @@
           <a:p>
             <a:fld id="{9642BF85-54FF-46CE-B398-87F998CFD60B}" type="datetimeFigureOut">
               <a:rPr lang="pt-BR" smtClean="0"/>
-              <a:t>19/08/2020</a:t>
+              <a:t>20/08/2020</a:t>
             </a:fld>
             <a:endParaRPr lang="pt-BR"/>
           </a:p>
@@ -5223,7 +5223,7 @@
           <a:p>
             <a:fld id="{9642BF85-54FF-46CE-B398-87F998CFD60B}" type="datetimeFigureOut">
               <a:rPr lang="pt-BR" smtClean="0"/>
-              <a:t>19/08/2020</a:t>
+              <a:t>20/08/2020</a:t>
             </a:fld>
             <a:endParaRPr lang="pt-BR"/>
           </a:p>
@@ -5357,7 +5357,7 @@
           <a:p>
             <a:fld id="{9642BF85-54FF-46CE-B398-87F998CFD60B}" type="datetimeFigureOut">
               <a:rPr lang="pt-BR" smtClean="0"/>
-              <a:t>19/08/2020</a:t>
+              <a:t>20/08/2020</a:t>
             </a:fld>
             <a:endParaRPr lang="pt-BR"/>
           </a:p>
@@ -5452,7 +5452,7 @@
           <a:p>
             <a:fld id="{9642BF85-54FF-46CE-B398-87F998CFD60B}" type="datetimeFigureOut">
               <a:rPr lang="pt-BR" smtClean="0"/>
-              <a:t>19/08/2020</a:t>
+              <a:t>20/08/2020</a:t>
             </a:fld>
             <a:endParaRPr lang="pt-BR"/>
           </a:p>
@@ -5727,7 +5727,7 @@
           <a:p>
             <a:fld id="{9642BF85-54FF-46CE-B398-87F998CFD60B}" type="datetimeFigureOut">
               <a:rPr lang="pt-BR" smtClean="0"/>
-              <a:t>19/08/2020</a:t>
+              <a:t>20/08/2020</a:t>
             </a:fld>
             <a:endParaRPr lang="pt-BR"/>
           </a:p>
@@ -5979,7 +5979,7 @@
           <a:p>
             <a:fld id="{9642BF85-54FF-46CE-B398-87F998CFD60B}" type="datetimeFigureOut">
               <a:rPr lang="pt-BR" smtClean="0"/>
-              <a:t>19/08/2020</a:t>
+              <a:t>20/08/2020</a:t>
             </a:fld>
             <a:endParaRPr lang="pt-BR"/>
           </a:p>
@@ -6199,7 +6199,7 @@
           <a:p>
             <a:fld id="{9642BF85-54FF-46CE-B398-87F998CFD60B}" type="datetimeFigureOut">
               <a:rPr lang="pt-BR" smtClean="0"/>
-              <a:t>19/08/2020</a:t>
+              <a:t>20/08/2020</a:t>
             </a:fld>
             <a:endParaRPr lang="pt-BR"/>
           </a:p>
@@ -6787,7 +6787,7 @@
           <a:p>
             <a:r>
               <a:rPr lang="pt-BR" dirty="0"/>
-              <a:t>Métodos de Trabalho</a:t>
+              <a:t>Fluxo de Trabalho</a:t>
             </a:r>
           </a:p>
         </p:txBody>
@@ -6891,6 +6891,14 @@
   <p:clrMapOvr>
     <a:masterClrMapping/>
   </p:clrMapOvr>
+  <mc:AlternateContent xmlns:mc="http://schemas.openxmlformats.org/markup-compatibility/2006">
+    <mc:Choice xmlns:p14="http://schemas.microsoft.com/office/powerpoint/2010/main" Requires="p14">
+      <p:transition spd="slow" p14:dur="2000" advTm="373328"/>
+    </mc:Choice>
+    <mc:Fallback>
+      <p:transition spd="slow" advTm="373328"/>
+    </mc:Fallback>
+  </mc:AlternateContent>
 </p:sld>
 </file>
 

</xml_diff>

<commit_message>
inclusão de uma ferramenta para Card Sorting
</commit_message>
<xml_diff>
--- a/hci.pptx
+++ b/hci.pptx
@@ -3220,7 +3220,7 @@
           <a:p>
             <a:fld id="{94D3EB41-CF60-4C9F-BD83-AE56FA0945EB}" type="datetimeFigureOut">
               <a:rPr lang="pt-BR" smtClean="0"/>
-              <a:t>20/08/2020</a:t>
+              <a:t>05/10/2020</a:t>
             </a:fld>
             <a:endParaRPr lang="pt-BR"/>
           </a:p>
@@ -3378,7 +3378,7 @@
           <a:p>
             <a:fld id="{020F486D-935E-4125-8FD7-C735663CC7DE}" type="slidenum">
               <a:rPr lang="pt-BR" smtClean="0"/>
-              <a:t>‹#›</a:t>
+              <a:t>‹nº›</a:t>
             </a:fld>
             <a:endParaRPr lang="pt-BR"/>
           </a:p>
@@ -3733,7 +3733,7 @@
           <a:p>
             <a:fld id="{9642BF85-54FF-46CE-B398-87F998CFD60B}" type="datetimeFigureOut">
               <a:rPr lang="pt-BR" smtClean="0"/>
-              <a:t>20/08/2020</a:t>
+              <a:t>05/10/2020</a:t>
             </a:fld>
             <a:endParaRPr lang="pt-BR"/>
           </a:p>
@@ -3775,7 +3775,7 @@
           <a:p>
             <a:fld id="{29185252-FBA3-417A-8652-C405B89605D8}" type="slidenum">
               <a:rPr lang="pt-BR" smtClean="0"/>
-              <a:t>‹#›</a:t>
+              <a:t>‹nº›</a:t>
             </a:fld>
             <a:endParaRPr lang="pt-BR"/>
           </a:p>
@@ -3901,7 +3901,7 @@
           <a:p>
             <a:fld id="{9642BF85-54FF-46CE-B398-87F998CFD60B}" type="datetimeFigureOut">
               <a:rPr lang="pt-BR" smtClean="0"/>
-              <a:t>20/08/2020</a:t>
+              <a:t>05/10/2020</a:t>
             </a:fld>
             <a:endParaRPr lang="pt-BR"/>
           </a:p>
@@ -3943,7 +3943,7 @@
           <a:p>
             <a:fld id="{29185252-FBA3-417A-8652-C405B89605D8}" type="slidenum">
               <a:rPr lang="pt-BR" smtClean="0"/>
-              <a:t>‹#›</a:t>
+              <a:t>‹nº›</a:t>
             </a:fld>
             <a:endParaRPr lang="pt-BR"/>
           </a:p>
@@ -4079,7 +4079,7 @@
           <a:p>
             <a:fld id="{9642BF85-54FF-46CE-B398-87F998CFD60B}" type="datetimeFigureOut">
               <a:rPr lang="pt-BR" smtClean="0"/>
-              <a:t>20/08/2020</a:t>
+              <a:t>05/10/2020</a:t>
             </a:fld>
             <a:endParaRPr lang="pt-BR"/>
           </a:p>
@@ -4121,7 +4121,7 @@
           <a:p>
             <a:fld id="{29185252-FBA3-417A-8652-C405B89605D8}" type="slidenum">
               <a:rPr lang="pt-BR" smtClean="0"/>
-              <a:t>‹#›</a:t>
+              <a:t>‹nº›</a:t>
             </a:fld>
             <a:endParaRPr lang="pt-BR"/>
           </a:p>
@@ -4342,7 +4342,7 @@
           <a:p>
             <a:fld id="{9642BF85-54FF-46CE-B398-87F998CFD60B}" type="datetimeFigureOut">
               <a:rPr lang="pt-BR" smtClean="0"/>
-              <a:t>20/08/2020</a:t>
+              <a:t>05/10/2020</a:t>
             </a:fld>
             <a:endParaRPr lang="pt-BR"/>
           </a:p>
@@ -4384,7 +4384,7 @@
           <a:p>
             <a:fld id="{29185252-FBA3-417A-8652-C405B89605D8}" type="slidenum">
               <a:rPr lang="pt-BR" smtClean="0"/>
-              <a:t>‹#›</a:t>
+              <a:t>‹nº›</a:t>
             </a:fld>
             <a:endParaRPr lang="pt-BR"/>
           </a:p>
@@ -4613,7 +4613,7 @@
           <a:p>
             <a:fld id="{9642BF85-54FF-46CE-B398-87F998CFD60B}" type="datetimeFigureOut">
               <a:rPr lang="pt-BR" smtClean="0"/>
-              <a:t>20/08/2020</a:t>
+              <a:t>05/10/2020</a:t>
             </a:fld>
             <a:endParaRPr lang="pt-BR"/>
           </a:p>
@@ -4655,7 +4655,7 @@
           <a:p>
             <a:fld id="{29185252-FBA3-417A-8652-C405B89605D8}" type="slidenum">
               <a:rPr lang="pt-BR" smtClean="0"/>
-              <a:t>‹#›</a:t>
+              <a:t>‹nº›</a:t>
             </a:fld>
             <a:endParaRPr lang="pt-BR"/>
           </a:p>
@@ -4859,7 +4859,7 @@
           <a:p>
             <a:fld id="{9642BF85-54FF-46CE-B398-87F998CFD60B}" type="datetimeFigureOut">
               <a:rPr lang="pt-BR" smtClean="0"/>
-              <a:t>20/08/2020</a:t>
+              <a:t>05/10/2020</a:t>
             </a:fld>
             <a:endParaRPr lang="pt-BR"/>
           </a:p>
@@ -4901,7 +4901,7 @@
           <a:p>
             <a:fld id="{29185252-FBA3-417A-8652-C405B89605D8}" type="slidenum">
               <a:rPr lang="pt-BR" smtClean="0"/>
-              <a:t>‹#›</a:t>
+              <a:t>‹nº›</a:t>
             </a:fld>
             <a:endParaRPr lang="pt-BR"/>
           </a:p>
@@ -5223,7 +5223,7 @@
           <a:p>
             <a:fld id="{9642BF85-54FF-46CE-B398-87F998CFD60B}" type="datetimeFigureOut">
               <a:rPr lang="pt-BR" smtClean="0"/>
-              <a:t>20/08/2020</a:t>
+              <a:t>05/10/2020</a:t>
             </a:fld>
             <a:endParaRPr lang="pt-BR"/>
           </a:p>
@@ -5265,7 +5265,7 @@
           <a:p>
             <a:fld id="{29185252-FBA3-417A-8652-C405B89605D8}" type="slidenum">
               <a:rPr lang="pt-BR" smtClean="0"/>
-              <a:t>‹#›</a:t>
+              <a:t>‹nº›</a:t>
             </a:fld>
             <a:endParaRPr lang="pt-BR"/>
           </a:p>
@@ -5357,7 +5357,7 @@
           <a:p>
             <a:fld id="{9642BF85-54FF-46CE-B398-87F998CFD60B}" type="datetimeFigureOut">
               <a:rPr lang="pt-BR" smtClean="0"/>
-              <a:t>20/08/2020</a:t>
+              <a:t>05/10/2020</a:t>
             </a:fld>
             <a:endParaRPr lang="pt-BR"/>
           </a:p>
@@ -5399,7 +5399,7 @@
           <a:p>
             <a:fld id="{29185252-FBA3-417A-8652-C405B89605D8}" type="slidenum">
               <a:rPr lang="pt-BR" smtClean="0"/>
-              <a:t>‹#›</a:t>
+              <a:t>‹nº›</a:t>
             </a:fld>
             <a:endParaRPr lang="pt-BR"/>
           </a:p>
@@ -5452,7 +5452,7 @@
           <a:p>
             <a:fld id="{9642BF85-54FF-46CE-B398-87F998CFD60B}" type="datetimeFigureOut">
               <a:rPr lang="pt-BR" smtClean="0"/>
-              <a:t>20/08/2020</a:t>
+              <a:t>05/10/2020</a:t>
             </a:fld>
             <a:endParaRPr lang="pt-BR"/>
           </a:p>
@@ -5494,7 +5494,7 @@
           <a:p>
             <a:fld id="{29185252-FBA3-417A-8652-C405B89605D8}" type="slidenum">
               <a:rPr lang="pt-BR" smtClean="0"/>
-              <a:t>‹#›</a:t>
+              <a:t>‹nº›</a:t>
             </a:fld>
             <a:endParaRPr lang="pt-BR"/>
           </a:p>
@@ -5727,7 +5727,7 @@
           <a:p>
             <a:fld id="{9642BF85-54FF-46CE-B398-87F998CFD60B}" type="datetimeFigureOut">
               <a:rPr lang="pt-BR" smtClean="0"/>
-              <a:t>20/08/2020</a:t>
+              <a:t>05/10/2020</a:t>
             </a:fld>
             <a:endParaRPr lang="pt-BR"/>
           </a:p>
@@ -5769,7 +5769,7 @@
           <a:p>
             <a:fld id="{29185252-FBA3-417A-8652-C405B89605D8}" type="slidenum">
               <a:rPr lang="pt-BR" smtClean="0"/>
-              <a:t>‹#›</a:t>
+              <a:t>‹nº›</a:t>
             </a:fld>
             <a:endParaRPr lang="pt-BR"/>
           </a:p>
@@ -5979,7 +5979,7 @@
           <a:p>
             <a:fld id="{9642BF85-54FF-46CE-B398-87F998CFD60B}" type="datetimeFigureOut">
               <a:rPr lang="pt-BR" smtClean="0"/>
-              <a:t>20/08/2020</a:t>
+              <a:t>05/10/2020</a:t>
             </a:fld>
             <a:endParaRPr lang="pt-BR"/>
           </a:p>
@@ -6021,7 +6021,7 @@
           <a:p>
             <a:fld id="{29185252-FBA3-417A-8652-C405B89605D8}" type="slidenum">
               <a:rPr lang="pt-BR" smtClean="0"/>
-              <a:t>‹#›</a:t>
+              <a:t>‹nº›</a:t>
             </a:fld>
             <a:endParaRPr lang="pt-BR"/>
           </a:p>
@@ -6199,7 +6199,7 @@
           <a:p>
             <a:fld id="{9642BF85-54FF-46CE-B398-87F998CFD60B}" type="datetimeFigureOut">
               <a:rPr lang="pt-BR" smtClean="0"/>
-              <a:t>20/08/2020</a:t>
+              <a:t>05/10/2020</a:t>
             </a:fld>
             <a:endParaRPr lang="pt-BR"/>
           </a:p>
@@ -6277,7 +6277,7 @@
           <a:p>
             <a:fld id="{29185252-FBA3-417A-8652-C405B89605D8}" type="slidenum">
               <a:rPr lang="pt-BR" smtClean="0"/>
-              <a:t>‹#›</a:t>
+              <a:t>‹nº›</a:t>
             </a:fld>
             <a:endParaRPr lang="pt-BR"/>
           </a:p>
@@ -6891,11 +6891,11 @@
   <p:clrMapOvr>
     <a:masterClrMapping/>
   </p:clrMapOvr>
-  <mc:AlternateContent xmlns:mc="http://schemas.openxmlformats.org/markup-compatibility/2006">
-    <mc:Choice xmlns:p14="http://schemas.microsoft.com/office/powerpoint/2010/main" Requires="p14">
+  <mc:AlternateContent xmlns:mc="http://schemas.openxmlformats.org/markup-compatibility/2006" xmlns:p14="http://schemas.microsoft.com/office/powerpoint/2010/main">
+    <mc:Choice Requires="p14">
       <p:transition spd="slow" p14:dur="2000" advTm="373328"/>
     </mc:Choice>
-    <mc:Fallback>
+    <mc:Fallback xmlns="">
       <p:transition spd="slow" advTm="373328"/>
     </mc:Fallback>
   </mc:AlternateContent>
@@ -7376,6 +7376,51 @@
           </a:extLst>
         </p:spPr>
       </p:pic>
+      <p:sp>
+        <p:nvSpPr>
+          <p:cNvPr id="5" name="CaixaDeTexto 4">
+            <a:extLst>
+              <a:ext uri="{FF2B5EF4-FFF2-40B4-BE49-F238E27FC236}">
+                <a16:creationId xmlns:a16="http://schemas.microsoft.com/office/drawing/2014/main" id="{25056FF2-C6B0-4C36-AB1A-DD03520F4FBE}"/>
+              </a:ext>
+            </a:extLst>
+          </p:cNvPr>
+          <p:cNvSpPr txBox="1"/>
+          <p:nvPr/>
+        </p:nvSpPr>
+        <p:spPr>
+          <a:xfrm>
+            <a:off x="8855243" y="4455230"/>
+            <a:ext cx="1459831" cy="369332"/>
+          </a:xfrm>
+          <a:prstGeom prst="rect">
+            <a:avLst/>
+          </a:prstGeom>
+          <a:noFill/>
+        </p:spPr>
+        <p:txBody>
+          <a:bodyPr wrap="square" rtlCol="0">
+            <a:spAutoFit/>
+          </a:bodyPr>
+          <a:lstStyle/>
+          <a:p>
+            <a:r>
+              <a:rPr lang="pt-BR" dirty="0"/>
+              <a:t>[ </a:t>
+            </a:r>
+            <a:r>
+              <a:rPr lang="pt-BR" dirty="0" err="1">
+                <a:hlinkClick r:id="rId3"/>
+              </a:rPr>
+              <a:t>Trello</a:t>
+            </a:r>
+            <a:r>
+              <a:rPr lang="pt-BR" dirty="0"/>
+              <a:t> ]</a:t>
+            </a:r>
+          </a:p>
+        </p:txBody>
+      </p:sp>
     </p:spTree>
     <p:extLst>
       <p:ext uri="{BB962C8B-B14F-4D97-AF65-F5344CB8AC3E}">

</xml_diff>